<commit_message>
Add reduced slides for TH
</commit_message>
<xml_diff>
--- a/HidKDE1.pptx
+++ b/HidKDE1.pptx
@@ -31838,6 +31838,465 @@
           </a:prstGeom>
         </p:spPr>
       </p:pic>
+      <p:grpSp>
+        <p:nvGrpSpPr>
+          <p:cNvPr id="5" name="Group 4"/>
+          <p:cNvGrpSpPr/>
+          <p:nvPr/>
+        </p:nvGrpSpPr>
+        <p:grpSpPr>
+          <a:xfrm>
+            <a:off x="381000" y="1676400"/>
+            <a:ext cx="2403681" cy="2385149"/>
+            <a:chOff x="1215791" y="2445603"/>
+            <a:chExt cx="2403681" cy="2385149"/>
+          </a:xfrm>
+        </p:grpSpPr>
+        <p:cxnSp>
+          <p:nvCxnSpPr>
+            <p:cNvPr id="6" name="Straight Arrow Connector 5"/>
+            <p:cNvCxnSpPr>
+              <a:stCxn id="7" idx="2"/>
+            </p:cNvCxnSpPr>
+            <p:nvPr/>
+          </p:nvCxnSpPr>
+          <p:spPr>
+            <a:xfrm>
+              <a:off x="2112832" y="3276600"/>
+              <a:ext cx="1506640" cy="1554152"/>
+            </a:xfrm>
+            <a:prstGeom prst="straightConnector1">
+              <a:avLst/>
+            </a:prstGeom>
+            <a:ln w="38100">
+              <a:solidFill>
+                <a:schemeClr val="bg2"/>
+              </a:solidFill>
+              <a:tailEnd type="triangle"/>
+            </a:ln>
+          </p:spPr>
+          <p:style>
+            <a:lnRef idx="1">
+              <a:schemeClr val="accent1"/>
+            </a:lnRef>
+            <a:fillRef idx="0">
+              <a:schemeClr val="accent1"/>
+            </a:fillRef>
+            <a:effectRef idx="0">
+              <a:schemeClr val="accent1"/>
+            </a:effectRef>
+            <a:fontRef idx="minor">
+              <a:schemeClr val="tx1"/>
+            </a:fontRef>
+          </p:style>
+        </p:cxnSp>
+        <p:sp>
+          <p:nvSpPr>
+            <p:cNvPr id="7" name="TextBox 6"/>
+            <p:cNvSpPr txBox="1"/>
+            <p:nvPr/>
+          </p:nvSpPr>
+          <p:spPr>
+            <a:xfrm>
+              <a:off x="1215791" y="2445603"/>
+              <a:ext cx="1794081" cy="830997"/>
+            </a:xfrm>
+            <a:prstGeom prst="rect">
+              <a:avLst/>
+            </a:prstGeom>
+            <a:noFill/>
+          </p:spPr>
+          <p:txBody>
+            <a:bodyPr wrap="none" rtlCol="0">
+              <a:spAutoFit/>
+            </a:bodyPr>
+            <a:lstStyle/>
+            <a:p>
+              <a:pPr marL="0" marR="0" lvl="0" indent="0" algn="l" defTabSz="914400" rtl="0" eaLnBrk="1" fontAlgn="base" latinLnBrk="0" hangingPunct="1">
+                <a:lnSpc>
+                  <a:spcPct val="100000"/>
+                </a:lnSpc>
+                <a:spcBef>
+                  <a:spcPct val="0"/>
+                </a:spcBef>
+                <a:spcAft>
+                  <a:spcPct val="0"/>
+                </a:spcAft>
+                <a:buClrTx/>
+                <a:buSzTx/>
+                <a:buFontTx/>
+                <a:buNone/>
+                <a:tabLst/>
+                <a:defRPr/>
+              </a:pPr>
+              <a:r>
+                <a:rPr kumimoji="0" lang="en-US" sz="2400" b="0" i="0" u="none" strike="noStrike" kern="1200" cap="none" spc="0" normalizeH="0" baseline="0" noProof="0" dirty="0" smtClean="0">
+                  <a:ln>
+                    <a:noFill/>
+                  </a:ln>
+                  <a:solidFill>
+                    <a:srgbClr val="000000"/>
+                  </a:solidFill>
+                  <a:effectLst/>
+                  <a:uLnTx/>
+                  <a:uFillTx/>
+                  <a:latin typeface="Arial" charset="0"/>
+                  <a:ea typeface="+mn-ea"/>
+                  <a:cs typeface="+mn-cs"/>
+                </a:rPr>
+                <a:t>Seems A</a:t>
+              </a:r>
+            </a:p>
+            <a:p>
+              <a:pPr marL="0" marR="0" lvl="0" indent="0" algn="l" defTabSz="914400" rtl="0" eaLnBrk="1" fontAlgn="base" latinLnBrk="0" hangingPunct="1">
+                <a:lnSpc>
+                  <a:spcPct val="100000"/>
+                </a:lnSpc>
+                <a:spcBef>
+                  <a:spcPct val="0"/>
+                </a:spcBef>
+                <a:spcAft>
+                  <a:spcPct val="0"/>
+                </a:spcAft>
+                <a:buClrTx/>
+                <a:buSzTx/>
+                <a:buFontTx/>
+                <a:buNone/>
+                <a:tabLst/>
+                <a:defRPr/>
+              </a:pPr>
+              <a:r>
+                <a:rPr lang="en-US" dirty="0" smtClean="0">
+                  <a:solidFill>
+                    <a:srgbClr val="000000"/>
+                  </a:solidFill>
+                </a:rPr>
+                <a:t>Little Wide?</a:t>
+              </a:r>
+              <a:endParaRPr kumimoji="0" lang="en-US" sz="2400" b="0" i="0" u="none" strike="noStrike" kern="1200" cap="none" spc="0" normalizeH="0" baseline="0" noProof="0" dirty="0">
+                <a:ln>
+                  <a:noFill/>
+                </a:ln>
+                <a:solidFill>
+                  <a:srgbClr val="000000"/>
+                </a:solidFill>
+                <a:effectLst/>
+                <a:uLnTx/>
+                <a:uFillTx/>
+                <a:latin typeface="Arial" charset="0"/>
+                <a:ea typeface="+mn-ea"/>
+                <a:cs typeface="+mn-cs"/>
+              </a:endParaRPr>
+            </a:p>
+          </p:txBody>
+        </p:sp>
+      </p:grpSp>
+      <p:grpSp>
+        <p:nvGrpSpPr>
+          <p:cNvPr id="13" name="Group 12"/>
+          <p:cNvGrpSpPr/>
+          <p:nvPr/>
+        </p:nvGrpSpPr>
+        <p:grpSpPr>
+          <a:xfrm>
+            <a:off x="3962400" y="1828800"/>
+            <a:ext cx="2536453" cy="3200400"/>
+            <a:chOff x="723872" y="2445603"/>
+            <a:chExt cx="2536453" cy="3200400"/>
+          </a:xfrm>
+        </p:grpSpPr>
+        <p:cxnSp>
+          <p:nvCxnSpPr>
+            <p:cNvPr id="14" name="Straight Arrow Connector 13"/>
+            <p:cNvCxnSpPr>
+              <a:stCxn id="15" idx="2"/>
+            </p:cNvCxnSpPr>
+            <p:nvPr/>
+          </p:nvCxnSpPr>
+          <p:spPr>
+            <a:xfrm flipH="1">
+              <a:off x="723872" y="3276600"/>
+              <a:ext cx="1514186" cy="2369403"/>
+            </a:xfrm>
+            <a:prstGeom prst="straightConnector1">
+              <a:avLst/>
+            </a:prstGeom>
+            <a:ln w="38100">
+              <a:solidFill>
+                <a:schemeClr val="bg2"/>
+              </a:solidFill>
+              <a:tailEnd type="triangle"/>
+            </a:ln>
+          </p:spPr>
+          <p:style>
+            <a:lnRef idx="1">
+              <a:schemeClr val="accent1"/>
+            </a:lnRef>
+            <a:fillRef idx="0">
+              <a:schemeClr val="accent1"/>
+            </a:fillRef>
+            <a:effectRef idx="0">
+              <a:schemeClr val="accent1"/>
+            </a:effectRef>
+            <a:fontRef idx="minor">
+              <a:schemeClr val="tx1"/>
+            </a:fontRef>
+          </p:style>
+        </p:cxnSp>
+        <p:sp>
+          <p:nvSpPr>
+            <p:cNvPr id="15" name="TextBox 14"/>
+            <p:cNvSpPr txBox="1"/>
+            <p:nvPr/>
+          </p:nvSpPr>
+          <p:spPr>
+            <a:xfrm>
+              <a:off x="1215791" y="2445603"/>
+              <a:ext cx="2044534" cy="830997"/>
+            </a:xfrm>
+            <a:prstGeom prst="rect">
+              <a:avLst/>
+            </a:prstGeom>
+            <a:noFill/>
+          </p:spPr>
+          <p:txBody>
+            <a:bodyPr wrap="none" rtlCol="0">
+              <a:spAutoFit/>
+            </a:bodyPr>
+            <a:lstStyle/>
+            <a:p>
+              <a:pPr marL="0" marR="0" lvl="0" indent="0" algn="l" defTabSz="914400" rtl="0" eaLnBrk="1" fontAlgn="base" latinLnBrk="0" hangingPunct="1">
+                <a:lnSpc>
+                  <a:spcPct val="100000"/>
+                </a:lnSpc>
+                <a:spcBef>
+                  <a:spcPct val="0"/>
+                </a:spcBef>
+                <a:spcAft>
+                  <a:spcPct val="0"/>
+                </a:spcAft>
+                <a:buClrTx/>
+                <a:buSzTx/>
+                <a:buFontTx/>
+                <a:buNone/>
+                <a:tabLst/>
+                <a:defRPr/>
+              </a:pPr>
+              <a:r>
+                <a:rPr kumimoji="0" lang="en-US" sz="2400" b="0" i="0" u="none" strike="noStrike" kern="1200" cap="none" spc="0" normalizeH="0" baseline="0" noProof="0" dirty="0" smtClean="0">
+                  <a:ln>
+                    <a:noFill/>
+                  </a:ln>
+                  <a:solidFill>
+                    <a:srgbClr val="000000"/>
+                  </a:solidFill>
+                  <a:effectLst/>
+                  <a:uLnTx/>
+                  <a:uFillTx/>
+                  <a:latin typeface="Arial" charset="0"/>
+                  <a:ea typeface="+mn-ea"/>
+                  <a:cs typeface="+mn-cs"/>
+                </a:rPr>
+                <a:t>Width OK,</a:t>
+              </a:r>
+            </a:p>
+            <a:p>
+              <a:pPr marL="0" marR="0" lvl="0" indent="0" algn="l" defTabSz="914400" rtl="0" eaLnBrk="1" fontAlgn="base" latinLnBrk="0" hangingPunct="1">
+                <a:lnSpc>
+                  <a:spcPct val="100000"/>
+                </a:lnSpc>
+                <a:spcBef>
+                  <a:spcPct val="0"/>
+                </a:spcBef>
+                <a:spcAft>
+                  <a:spcPct val="0"/>
+                </a:spcAft>
+                <a:buClrTx/>
+                <a:buSzTx/>
+                <a:buFontTx/>
+                <a:buNone/>
+                <a:tabLst/>
+                <a:defRPr/>
+              </a:pPr>
+              <a:r>
+                <a:rPr lang="en-US" dirty="0" smtClean="0">
+                  <a:solidFill>
+                    <a:srgbClr val="000000"/>
+                  </a:solidFill>
+                </a:rPr>
+                <a:t>But Too Low?</a:t>
+              </a:r>
+              <a:endParaRPr kumimoji="0" lang="en-US" sz="2400" b="0" i="0" u="none" strike="noStrike" kern="1200" cap="none" spc="0" normalizeH="0" baseline="0" noProof="0" dirty="0">
+                <a:ln>
+                  <a:noFill/>
+                </a:ln>
+                <a:solidFill>
+                  <a:srgbClr val="000000"/>
+                </a:solidFill>
+                <a:effectLst/>
+                <a:uLnTx/>
+                <a:uFillTx/>
+                <a:latin typeface="Arial" charset="0"/>
+                <a:ea typeface="+mn-ea"/>
+                <a:cs typeface="+mn-cs"/>
+              </a:endParaRPr>
+            </a:p>
+          </p:txBody>
+        </p:sp>
+      </p:grpSp>
+      <p:grpSp>
+        <p:nvGrpSpPr>
+          <p:cNvPr id="18" name="Group 17"/>
+          <p:cNvGrpSpPr/>
+          <p:nvPr/>
+        </p:nvGrpSpPr>
+        <p:grpSpPr>
+          <a:xfrm>
+            <a:off x="6302757" y="2819400"/>
+            <a:ext cx="2096836" cy="3200400"/>
+            <a:chOff x="723882" y="2445603"/>
+            <a:chExt cx="2096836" cy="3200400"/>
+          </a:xfrm>
+        </p:grpSpPr>
+        <p:cxnSp>
+          <p:nvCxnSpPr>
+            <p:cNvPr id="19" name="Straight Arrow Connector 18"/>
+            <p:cNvCxnSpPr>
+              <a:stCxn id="20" idx="2"/>
+            </p:cNvCxnSpPr>
+            <p:nvPr/>
+          </p:nvCxnSpPr>
+          <p:spPr>
+            <a:xfrm flipH="1">
+              <a:off x="723882" y="3276600"/>
+              <a:ext cx="1294373" cy="2369403"/>
+            </a:xfrm>
+            <a:prstGeom prst="straightConnector1">
+              <a:avLst/>
+            </a:prstGeom>
+            <a:ln w="38100">
+              <a:solidFill>
+                <a:schemeClr val="bg2"/>
+              </a:solidFill>
+              <a:tailEnd type="triangle"/>
+            </a:ln>
+          </p:spPr>
+          <p:style>
+            <a:lnRef idx="1">
+              <a:schemeClr val="accent1"/>
+            </a:lnRef>
+            <a:fillRef idx="0">
+              <a:schemeClr val="accent1"/>
+            </a:fillRef>
+            <a:effectRef idx="0">
+              <a:schemeClr val="accent1"/>
+            </a:effectRef>
+            <a:fontRef idx="minor">
+              <a:schemeClr val="tx1"/>
+            </a:fontRef>
+          </p:style>
+        </p:cxnSp>
+        <p:sp>
+          <p:nvSpPr>
+            <p:cNvPr id="20" name="TextBox 19"/>
+            <p:cNvSpPr txBox="1"/>
+            <p:nvPr/>
+          </p:nvSpPr>
+          <p:spPr>
+            <a:xfrm>
+              <a:off x="1215791" y="2445603"/>
+              <a:ext cx="1604927" cy="830997"/>
+            </a:xfrm>
+            <a:prstGeom prst="rect">
+              <a:avLst/>
+            </a:prstGeom>
+            <a:noFill/>
+          </p:spPr>
+          <p:txBody>
+            <a:bodyPr wrap="none" rtlCol="0">
+              <a:spAutoFit/>
+            </a:bodyPr>
+            <a:lstStyle/>
+            <a:p>
+              <a:pPr marL="0" marR="0" lvl="0" indent="0" algn="l" defTabSz="914400" rtl="0" eaLnBrk="1" fontAlgn="base" latinLnBrk="0" hangingPunct="1">
+                <a:lnSpc>
+                  <a:spcPct val="100000"/>
+                </a:lnSpc>
+                <a:spcBef>
+                  <a:spcPct val="0"/>
+                </a:spcBef>
+                <a:spcAft>
+                  <a:spcPct val="0"/>
+                </a:spcAft>
+                <a:buClrTx/>
+                <a:buSzTx/>
+                <a:buFontTx/>
+                <a:buNone/>
+                <a:tabLst/>
+                <a:defRPr/>
+              </a:pPr>
+              <a:r>
+                <a:rPr kumimoji="0" lang="en-US" sz="2400" b="0" i="0" u="none" strike="noStrike" kern="1200" cap="none" spc="0" normalizeH="0" baseline="0" noProof="0" dirty="0" smtClean="0">
+                  <a:ln>
+                    <a:noFill/>
+                  </a:ln>
+                  <a:solidFill>
+                    <a:srgbClr val="000000"/>
+                  </a:solidFill>
+                  <a:effectLst/>
+                  <a:uLnTx/>
+                  <a:uFillTx/>
+                  <a:latin typeface="Arial" charset="0"/>
+                  <a:ea typeface="+mn-ea"/>
+                  <a:cs typeface="+mn-cs"/>
+                </a:rPr>
+                <a:t>Missed </a:t>
+              </a:r>
+            </a:p>
+            <a:p>
+              <a:pPr marL="0" marR="0" lvl="0" indent="0" algn="l" defTabSz="914400" rtl="0" eaLnBrk="1" fontAlgn="base" latinLnBrk="0" hangingPunct="1">
+                <a:lnSpc>
+                  <a:spcPct val="100000"/>
+                </a:lnSpc>
+                <a:spcBef>
+                  <a:spcPct val="0"/>
+                </a:spcBef>
+                <a:spcAft>
+                  <a:spcPct val="0"/>
+                </a:spcAft>
+                <a:buClrTx/>
+                <a:buSzTx/>
+                <a:buFontTx/>
+                <a:buNone/>
+                <a:tabLst/>
+                <a:defRPr/>
+              </a:pPr>
+              <a:r>
+                <a:rPr lang="en-US" dirty="0" smtClean="0">
+                  <a:solidFill>
+                    <a:srgbClr val="000000"/>
+                  </a:solidFill>
+                </a:rPr>
+                <a:t>This One?</a:t>
+              </a:r>
+              <a:endParaRPr kumimoji="0" lang="en-US" sz="2400" b="0" i="0" u="none" strike="noStrike" kern="1200" cap="none" spc="0" normalizeH="0" baseline="0" noProof="0" dirty="0">
+                <a:ln>
+                  <a:noFill/>
+                </a:ln>
+                <a:solidFill>
+                  <a:srgbClr val="000000"/>
+                </a:solidFill>
+                <a:effectLst/>
+                <a:uLnTx/>
+                <a:uFillTx/>
+                <a:latin typeface="Arial" charset="0"/>
+                <a:ea typeface="+mn-ea"/>
+                <a:cs typeface="+mn-cs"/>
+              </a:endParaRPr>
+            </a:p>
+          </p:txBody>
+        </p:sp>
+      </p:grpSp>
     </p:spTree>
     <p:extLst>
       <p:ext uri="{BB962C8B-B14F-4D97-AF65-F5344CB8AC3E}">
@@ -31851,7 +32310,189 @@
   <p:timing>
     <p:tnLst>
       <p:par>
-        <p:cTn id="1" dur="indefinite" restart="never" nodeType="tmRoot"/>
+        <p:cTn id="1" dur="indefinite" restart="never" nodeType="tmRoot">
+          <p:childTnLst>
+            <p:seq concurrent="1" nextAc="seek">
+              <p:cTn id="2" dur="indefinite" nodeType="mainSeq">
+                <p:childTnLst>
+                  <p:par>
+                    <p:cTn id="3" fill="hold">
+                      <p:stCondLst>
+                        <p:cond delay="indefinite"/>
+                      </p:stCondLst>
+                      <p:childTnLst>
+                        <p:par>
+                          <p:cTn id="4" fill="hold">
+                            <p:stCondLst>
+                              <p:cond delay="0"/>
+                            </p:stCondLst>
+                            <p:childTnLst>
+                              <p:par>
+                                <p:cTn id="5" presetID="10" presetClass="entr" presetSubtype="0" fill="hold" nodeType="clickEffect">
+                                  <p:stCondLst>
+                                    <p:cond delay="0"/>
+                                  </p:stCondLst>
+                                  <p:childTnLst>
+                                    <p:set>
+                                      <p:cBhvr>
+                                        <p:cTn id="6" dur="1" fill="hold">
+                                          <p:stCondLst>
+                                            <p:cond delay="0"/>
+                                          </p:stCondLst>
+                                        </p:cTn>
+                                        <p:tgtEl>
+                                          <p:spTgt spid="5"/>
+                                        </p:tgtEl>
+                                        <p:attrNameLst>
+                                          <p:attrName>style.visibility</p:attrName>
+                                        </p:attrNameLst>
+                                      </p:cBhvr>
+                                      <p:to>
+                                        <p:strVal val="visible"/>
+                                      </p:to>
+                                    </p:set>
+                                    <p:animEffect transition="in" filter="fade">
+                                      <p:cBhvr>
+                                        <p:cTn id="7" dur="500"/>
+                                        <p:tgtEl>
+                                          <p:spTgt spid="5"/>
+                                        </p:tgtEl>
+                                      </p:cBhvr>
+                                    </p:animEffect>
+                                  </p:childTnLst>
+                                </p:cTn>
+                              </p:par>
+                            </p:childTnLst>
+                          </p:cTn>
+                        </p:par>
+                      </p:childTnLst>
+                    </p:cTn>
+                  </p:par>
+                  <p:par>
+                    <p:cTn id="8" fill="hold">
+                      <p:stCondLst>
+                        <p:cond delay="indefinite"/>
+                      </p:stCondLst>
+                      <p:childTnLst>
+                        <p:par>
+                          <p:cTn id="9" fill="hold">
+                            <p:stCondLst>
+                              <p:cond delay="0"/>
+                            </p:stCondLst>
+                            <p:childTnLst>
+                              <p:par>
+                                <p:cTn id="10" presetID="10" presetClass="entr" presetSubtype="0" fill="hold" nodeType="clickEffect">
+                                  <p:stCondLst>
+                                    <p:cond delay="0"/>
+                                  </p:stCondLst>
+                                  <p:childTnLst>
+                                    <p:set>
+                                      <p:cBhvr>
+                                        <p:cTn id="11" dur="1" fill="hold">
+                                          <p:stCondLst>
+                                            <p:cond delay="0"/>
+                                          </p:stCondLst>
+                                        </p:cTn>
+                                        <p:tgtEl>
+                                          <p:spTgt spid="13"/>
+                                        </p:tgtEl>
+                                        <p:attrNameLst>
+                                          <p:attrName>style.visibility</p:attrName>
+                                        </p:attrNameLst>
+                                      </p:cBhvr>
+                                      <p:to>
+                                        <p:strVal val="visible"/>
+                                      </p:to>
+                                    </p:set>
+                                    <p:animEffect transition="in" filter="fade">
+                                      <p:cBhvr>
+                                        <p:cTn id="12" dur="500"/>
+                                        <p:tgtEl>
+                                          <p:spTgt spid="13"/>
+                                        </p:tgtEl>
+                                      </p:cBhvr>
+                                    </p:animEffect>
+                                  </p:childTnLst>
+                                </p:cTn>
+                              </p:par>
+                            </p:childTnLst>
+                          </p:cTn>
+                        </p:par>
+                      </p:childTnLst>
+                    </p:cTn>
+                  </p:par>
+                  <p:par>
+                    <p:cTn id="13" fill="hold">
+                      <p:stCondLst>
+                        <p:cond delay="indefinite"/>
+                      </p:stCondLst>
+                      <p:childTnLst>
+                        <p:par>
+                          <p:cTn id="14" fill="hold">
+                            <p:stCondLst>
+                              <p:cond delay="0"/>
+                            </p:stCondLst>
+                            <p:childTnLst>
+                              <p:par>
+                                <p:cTn id="15" presetID="10" presetClass="entr" presetSubtype="0" fill="hold" nodeType="clickEffect">
+                                  <p:stCondLst>
+                                    <p:cond delay="0"/>
+                                  </p:stCondLst>
+                                  <p:childTnLst>
+                                    <p:set>
+                                      <p:cBhvr>
+                                        <p:cTn id="16" dur="1" fill="hold">
+                                          <p:stCondLst>
+                                            <p:cond delay="0"/>
+                                          </p:stCondLst>
+                                        </p:cTn>
+                                        <p:tgtEl>
+                                          <p:spTgt spid="18"/>
+                                        </p:tgtEl>
+                                        <p:attrNameLst>
+                                          <p:attrName>style.visibility</p:attrName>
+                                        </p:attrNameLst>
+                                      </p:cBhvr>
+                                      <p:to>
+                                        <p:strVal val="visible"/>
+                                      </p:to>
+                                    </p:set>
+                                    <p:animEffect transition="in" filter="fade">
+                                      <p:cBhvr>
+                                        <p:cTn id="17" dur="500"/>
+                                        <p:tgtEl>
+                                          <p:spTgt spid="18"/>
+                                        </p:tgtEl>
+                                      </p:cBhvr>
+                                    </p:animEffect>
+                                  </p:childTnLst>
+                                </p:cTn>
+                              </p:par>
+                            </p:childTnLst>
+                          </p:cTn>
+                        </p:par>
+                      </p:childTnLst>
+                    </p:cTn>
+                  </p:par>
+                </p:childTnLst>
+              </p:cTn>
+              <p:prevCondLst>
+                <p:cond evt="onPrev" delay="0">
+                  <p:tgtEl>
+                    <p:sldTgt/>
+                  </p:tgtEl>
+                </p:cond>
+              </p:prevCondLst>
+              <p:nextCondLst>
+                <p:cond evt="onNext" delay="0">
+                  <p:tgtEl>
+                    <p:sldTgt/>
+                  </p:tgtEl>
+                </p:cond>
+              </p:nextCondLst>
+            </p:seq>
+          </p:childTnLst>
+        </p:cTn>
       </p:par>
     </p:tnLst>
   </p:timing>
@@ -32106,6 +32747,442 @@
           </a:prstGeom>
         </p:spPr>
       </p:pic>
+      <p:grpSp>
+        <p:nvGrpSpPr>
+          <p:cNvPr id="5" name="Group 4"/>
+          <p:cNvGrpSpPr/>
+          <p:nvPr/>
+        </p:nvGrpSpPr>
+        <p:grpSpPr>
+          <a:xfrm>
+            <a:off x="381000" y="1295400"/>
+            <a:ext cx="2375971" cy="1600200"/>
+            <a:chOff x="1215791" y="2445603"/>
+            <a:chExt cx="2375971" cy="1600200"/>
+          </a:xfrm>
+        </p:grpSpPr>
+        <p:cxnSp>
+          <p:nvCxnSpPr>
+            <p:cNvPr id="6" name="Straight Arrow Connector 5"/>
+            <p:cNvCxnSpPr>
+              <a:stCxn id="7" idx="2"/>
+            </p:cNvCxnSpPr>
+            <p:nvPr/>
+          </p:nvCxnSpPr>
+          <p:spPr>
+            <a:xfrm>
+              <a:off x="2403777" y="2907268"/>
+              <a:ext cx="793214" cy="1138535"/>
+            </a:xfrm>
+            <a:prstGeom prst="straightConnector1">
+              <a:avLst/>
+            </a:prstGeom>
+            <a:ln w="38100">
+              <a:solidFill>
+                <a:schemeClr val="bg2"/>
+              </a:solidFill>
+              <a:tailEnd type="triangle"/>
+            </a:ln>
+          </p:spPr>
+          <p:style>
+            <a:lnRef idx="1">
+              <a:schemeClr val="accent1"/>
+            </a:lnRef>
+            <a:fillRef idx="0">
+              <a:schemeClr val="accent1"/>
+            </a:fillRef>
+            <a:effectRef idx="0">
+              <a:schemeClr val="accent1"/>
+            </a:effectRef>
+            <a:fontRef idx="minor">
+              <a:schemeClr val="tx1"/>
+            </a:fontRef>
+          </p:style>
+        </p:cxnSp>
+        <p:sp>
+          <p:nvSpPr>
+            <p:cNvPr id="7" name="TextBox 6"/>
+            <p:cNvSpPr txBox="1"/>
+            <p:nvPr/>
+          </p:nvSpPr>
+          <p:spPr>
+            <a:xfrm>
+              <a:off x="1215791" y="2445603"/>
+              <a:ext cx="2375971" cy="461665"/>
+            </a:xfrm>
+            <a:prstGeom prst="rect">
+              <a:avLst/>
+            </a:prstGeom>
+            <a:noFill/>
+          </p:spPr>
+          <p:txBody>
+            <a:bodyPr wrap="none" rtlCol="0">
+              <a:spAutoFit/>
+            </a:bodyPr>
+            <a:lstStyle/>
+            <a:p>
+              <a:pPr marL="0" marR="0" lvl="0" indent="0" algn="l" defTabSz="914400" rtl="0" eaLnBrk="1" fontAlgn="base" latinLnBrk="0" hangingPunct="1">
+                <a:lnSpc>
+                  <a:spcPct val="100000"/>
+                </a:lnSpc>
+                <a:spcBef>
+                  <a:spcPct val="0"/>
+                </a:spcBef>
+                <a:spcAft>
+                  <a:spcPct val="0"/>
+                </a:spcAft>
+                <a:buClrTx/>
+                <a:buSzTx/>
+                <a:buFontTx/>
+                <a:buNone/>
+                <a:tabLst/>
+                <a:defRPr/>
+              </a:pPr>
+              <a:r>
+                <a:rPr lang="en-US" dirty="0" err="1" smtClean="0">
+                  <a:solidFill>
+                    <a:srgbClr val="000000"/>
+                  </a:solidFill>
+                </a:rPr>
+                <a:t>Oversmoothed</a:t>
+              </a:r>
+              <a:r>
+                <a:rPr lang="en-US" dirty="0" smtClean="0">
+                  <a:solidFill>
+                    <a:srgbClr val="000000"/>
+                  </a:solidFill>
+                </a:rPr>
+                <a:t>?</a:t>
+              </a:r>
+              <a:endParaRPr kumimoji="0" lang="en-US" sz="2400" b="0" i="0" u="none" strike="noStrike" kern="1200" cap="none" spc="0" normalizeH="0" baseline="0" noProof="0" dirty="0">
+                <a:ln>
+                  <a:noFill/>
+                </a:ln>
+                <a:solidFill>
+                  <a:srgbClr val="000000"/>
+                </a:solidFill>
+                <a:effectLst/>
+                <a:uLnTx/>
+                <a:uFillTx/>
+                <a:latin typeface="Arial" charset="0"/>
+                <a:ea typeface="+mn-ea"/>
+                <a:cs typeface="+mn-cs"/>
+              </a:endParaRPr>
+            </a:p>
+          </p:txBody>
+        </p:sp>
+      </p:grpSp>
+      <p:grpSp>
+        <p:nvGrpSpPr>
+          <p:cNvPr id="9" name="Group 8"/>
+          <p:cNvGrpSpPr/>
+          <p:nvPr/>
+        </p:nvGrpSpPr>
+        <p:grpSpPr>
+          <a:xfrm>
+            <a:off x="4267200" y="2743200"/>
+            <a:ext cx="1965603" cy="2895600"/>
+            <a:chOff x="1215791" y="2445603"/>
+            <a:chExt cx="1965603" cy="2895600"/>
+          </a:xfrm>
+        </p:grpSpPr>
+        <p:cxnSp>
+          <p:nvCxnSpPr>
+            <p:cNvPr id="10" name="Straight Arrow Connector 9"/>
+            <p:cNvCxnSpPr>
+              <a:stCxn id="11" idx="2"/>
+            </p:cNvCxnSpPr>
+            <p:nvPr/>
+          </p:nvCxnSpPr>
+          <p:spPr>
+            <a:xfrm flipH="1">
+              <a:off x="1672996" y="3276600"/>
+              <a:ext cx="525597" cy="2064603"/>
+            </a:xfrm>
+            <a:prstGeom prst="straightConnector1">
+              <a:avLst/>
+            </a:prstGeom>
+            <a:ln w="38100">
+              <a:solidFill>
+                <a:schemeClr val="bg2"/>
+              </a:solidFill>
+              <a:tailEnd type="triangle"/>
+            </a:ln>
+          </p:spPr>
+          <p:style>
+            <a:lnRef idx="1">
+              <a:schemeClr val="accent1"/>
+            </a:lnRef>
+            <a:fillRef idx="0">
+              <a:schemeClr val="accent1"/>
+            </a:fillRef>
+            <a:effectRef idx="0">
+              <a:schemeClr val="accent1"/>
+            </a:effectRef>
+            <a:fontRef idx="minor">
+              <a:schemeClr val="tx1"/>
+            </a:fontRef>
+          </p:style>
+        </p:cxnSp>
+        <p:sp>
+          <p:nvSpPr>
+            <p:cNvPr id="11" name="TextBox 10"/>
+            <p:cNvSpPr txBox="1"/>
+            <p:nvPr/>
+          </p:nvSpPr>
+          <p:spPr>
+            <a:xfrm>
+              <a:off x="1215791" y="2445603"/>
+              <a:ext cx="1965603" cy="830997"/>
+            </a:xfrm>
+            <a:prstGeom prst="rect">
+              <a:avLst/>
+            </a:prstGeom>
+            <a:noFill/>
+          </p:spPr>
+          <p:txBody>
+            <a:bodyPr wrap="none" rtlCol="0">
+              <a:spAutoFit/>
+            </a:bodyPr>
+            <a:lstStyle/>
+            <a:p>
+              <a:pPr marL="0" marR="0" lvl="0" indent="0" algn="l" defTabSz="914400" rtl="0" eaLnBrk="1" fontAlgn="base" latinLnBrk="0" hangingPunct="1">
+                <a:lnSpc>
+                  <a:spcPct val="100000"/>
+                </a:lnSpc>
+                <a:spcBef>
+                  <a:spcPct val="0"/>
+                </a:spcBef>
+                <a:spcAft>
+                  <a:spcPct val="0"/>
+                </a:spcAft>
+                <a:buClrTx/>
+                <a:buSzTx/>
+                <a:buFontTx/>
+                <a:buNone/>
+                <a:tabLst/>
+                <a:defRPr/>
+              </a:pPr>
+              <a:r>
+                <a:rPr kumimoji="0" lang="en-US" sz="2400" b="0" i="0" u="none" strike="noStrike" kern="1200" cap="none" spc="0" normalizeH="0" baseline="0" noProof="0" dirty="0" smtClean="0">
+                  <a:ln>
+                    <a:noFill/>
+                  </a:ln>
+                  <a:solidFill>
+                    <a:srgbClr val="000000"/>
+                  </a:solidFill>
+                  <a:effectLst/>
+                  <a:uLnTx/>
+                  <a:uFillTx/>
+                  <a:latin typeface="Arial" charset="0"/>
+                  <a:ea typeface="+mn-ea"/>
+                  <a:cs typeface="+mn-cs"/>
+                </a:rPr>
+                <a:t>Smoothed</a:t>
+              </a:r>
+              <a:endParaRPr lang="en-US" dirty="0">
+                <a:solidFill>
+                  <a:srgbClr val="000000"/>
+                </a:solidFill>
+              </a:endParaRPr>
+            </a:p>
+            <a:p>
+              <a:pPr marL="0" marR="0" lvl="0" indent="0" algn="l" defTabSz="914400" rtl="0" eaLnBrk="1" fontAlgn="base" latinLnBrk="0" hangingPunct="1">
+                <a:lnSpc>
+                  <a:spcPct val="100000"/>
+                </a:lnSpc>
+                <a:spcBef>
+                  <a:spcPct val="0"/>
+                </a:spcBef>
+                <a:spcAft>
+                  <a:spcPct val="0"/>
+                </a:spcAft>
+                <a:buClrTx/>
+                <a:buSzTx/>
+                <a:buFontTx/>
+                <a:buNone/>
+                <a:tabLst/>
+                <a:defRPr/>
+              </a:pPr>
+              <a:r>
+                <a:rPr kumimoji="0" lang="en-US" sz="2400" b="0" i="0" u="none" strike="noStrike" kern="1200" cap="none" spc="0" normalizeH="0" baseline="0" noProof="0" dirty="0" smtClean="0">
+                  <a:ln>
+                    <a:noFill/>
+                  </a:ln>
+                  <a:solidFill>
+                    <a:srgbClr val="000000"/>
+                  </a:solidFill>
+                  <a:effectLst/>
+                  <a:uLnTx/>
+                  <a:uFillTx/>
+                  <a:latin typeface="Arial" charset="0"/>
+                  <a:ea typeface="+mn-ea"/>
+                  <a:cs typeface="+mn-cs"/>
+                </a:rPr>
+                <a:t>About Right?</a:t>
+              </a:r>
+            </a:p>
+          </p:txBody>
+        </p:sp>
+      </p:grpSp>
+      <p:grpSp>
+        <p:nvGrpSpPr>
+          <p:cNvPr id="13" name="Group 12"/>
+          <p:cNvGrpSpPr/>
+          <p:nvPr/>
+        </p:nvGrpSpPr>
+        <p:grpSpPr>
+          <a:xfrm>
+            <a:off x="6400803" y="3962400"/>
+            <a:ext cx="2687721" cy="1905000"/>
+            <a:chOff x="905644" y="2445603"/>
+            <a:chExt cx="2687721" cy="1905000"/>
+          </a:xfrm>
+        </p:grpSpPr>
+        <p:cxnSp>
+          <p:nvCxnSpPr>
+            <p:cNvPr id="14" name="Straight Arrow Connector 13"/>
+            <p:cNvCxnSpPr>
+              <a:stCxn id="15" idx="2"/>
+            </p:cNvCxnSpPr>
+            <p:nvPr/>
+          </p:nvCxnSpPr>
+          <p:spPr>
+            <a:xfrm flipH="1">
+              <a:off x="905644" y="3276600"/>
+              <a:ext cx="1498934" cy="1074003"/>
+            </a:xfrm>
+            <a:prstGeom prst="straightConnector1">
+              <a:avLst/>
+            </a:prstGeom>
+            <a:ln w="38100">
+              <a:solidFill>
+                <a:schemeClr val="bg2"/>
+              </a:solidFill>
+              <a:tailEnd type="triangle"/>
+            </a:ln>
+          </p:spPr>
+          <p:style>
+            <a:lnRef idx="1">
+              <a:schemeClr val="accent1"/>
+            </a:lnRef>
+            <a:fillRef idx="0">
+              <a:schemeClr val="accent1"/>
+            </a:fillRef>
+            <a:effectRef idx="0">
+              <a:schemeClr val="accent1"/>
+            </a:effectRef>
+            <a:fontRef idx="minor">
+              <a:schemeClr val="tx1"/>
+            </a:fontRef>
+          </p:style>
+        </p:cxnSp>
+        <p:sp>
+          <p:nvSpPr>
+            <p:cNvPr id="15" name="TextBox 14"/>
+            <p:cNvSpPr txBox="1"/>
+            <p:nvPr/>
+          </p:nvSpPr>
+          <p:spPr>
+            <a:xfrm>
+              <a:off x="1215791" y="2445603"/>
+              <a:ext cx="2377574" cy="830997"/>
+            </a:xfrm>
+            <a:prstGeom prst="rect">
+              <a:avLst/>
+            </a:prstGeom>
+            <a:noFill/>
+          </p:spPr>
+          <p:txBody>
+            <a:bodyPr wrap="none" rtlCol="0">
+              <a:spAutoFit/>
+            </a:bodyPr>
+            <a:lstStyle/>
+            <a:p>
+              <a:pPr marL="0" marR="0" lvl="0" indent="0" algn="l" defTabSz="914400" rtl="0" eaLnBrk="1" fontAlgn="base" latinLnBrk="0" hangingPunct="1">
+                <a:lnSpc>
+                  <a:spcPct val="100000"/>
+                </a:lnSpc>
+                <a:spcBef>
+                  <a:spcPct val="0"/>
+                </a:spcBef>
+                <a:spcAft>
+                  <a:spcPct val="0"/>
+                </a:spcAft>
+                <a:buClrTx/>
+                <a:buSzTx/>
+                <a:buFontTx/>
+                <a:buNone/>
+                <a:tabLst/>
+                <a:defRPr/>
+              </a:pPr>
+              <a:r>
+                <a:rPr kumimoji="0" lang="en-US" sz="2400" b="0" i="0" u="none" strike="noStrike" kern="1200" cap="none" spc="0" normalizeH="0" baseline="0" noProof="0" dirty="0" smtClean="0">
+                  <a:ln>
+                    <a:noFill/>
+                  </a:ln>
+                  <a:solidFill>
+                    <a:srgbClr val="000000"/>
+                  </a:solidFill>
+                  <a:effectLst/>
+                  <a:uLnTx/>
+                  <a:uFillTx/>
+                  <a:latin typeface="Arial" charset="0"/>
+                  <a:ea typeface="+mn-ea"/>
+                  <a:cs typeface="+mn-cs"/>
+                </a:rPr>
+                <a:t>Way</a:t>
+              </a:r>
+              <a:endParaRPr lang="en-US" dirty="0" smtClean="0">
+                <a:solidFill>
+                  <a:srgbClr val="000000"/>
+                </a:solidFill>
+              </a:endParaRPr>
+            </a:p>
+            <a:p>
+              <a:pPr marL="0" marR="0" lvl="0" indent="0" algn="l" defTabSz="914400" rtl="0" eaLnBrk="1" fontAlgn="base" latinLnBrk="0" hangingPunct="1">
+                <a:lnSpc>
+                  <a:spcPct val="100000"/>
+                </a:lnSpc>
+                <a:spcBef>
+                  <a:spcPct val="0"/>
+                </a:spcBef>
+                <a:spcAft>
+                  <a:spcPct val="0"/>
+                </a:spcAft>
+                <a:buClrTx/>
+                <a:buSzTx/>
+                <a:buFontTx/>
+                <a:buNone/>
+                <a:tabLst/>
+                <a:defRPr/>
+              </a:pPr>
+              <a:r>
+                <a:rPr lang="en-US" dirty="0" err="1" smtClean="0">
+                  <a:solidFill>
+                    <a:srgbClr val="000000"/>
+                  </a:solidFill>
+                </a:rPr>
+                <a:t>Undersmoothed</a:t>
+              </a:r>
+              <a:endParaRPr kumimoji="0" lang="en-US" sz="2400" b="0" i="0" u="none" strike="noStrike" kern="1200" cap="none" spc="0" normalizeH="0" baseline="0" noProof="0" dirty="0">
+                <a:ln>
+                  <a:noFill/>
+                </a:ln>
+                <a:solidFill>
+                  <a:srgbClr val="000000"/>
+                </a:solidFill>
+                <a:effectLst/>
+                <a:uLnTx/>
+                <a:uFillTx/>
+                <a:latin typeface="Arial" charset="0"/>
+                <a:ea typeface="+mn-ea"/>
+                <a:cs typeface="+mn-cs"/>
+              </a:endParaRPr>
+            </a:p>
+          </p:txBody>
+        </p:sp>
+      </p:grpSp>
     </p:spTree>
     <p:extLst>
       <p:ext uri="{BB962C8B-B14F-4D97-AF65-F5344CB8AC3E}">
@@ -32119,7 +33196,189 @@
   <p:timing>
     <p:tnLst>
       <p:par>
-        <p:cTn id="1" dur="indefinite" restart="never" nodeType="tmRoot"/>
+        <p:cTn id="1" dur="indefinite" restart="never" nodeType="tmRoot">
+          <p:childTnLst>
+            <p:seq concurrent="1" nextAc="seek">
+              <p:cTn id="2" dur="indefinite" nodeType="mainSeq">
+                <p:childTnLst>
+                  <p:par>
+                    <p:cTn id="3" fill="hold">
+                      <p:stCondLst>
+                        <p:cond delay="indefinite"/>
+                      </p:stCondLst>
+                      <p:childTnLst>
+                        <p:par>
+                          <p:cTn id="4" fill="hold">
+                            <p:stCondLst>
+                              <p:cond delay="0"/>
+                            </p:stCondLst>
+                            <p:childTnLst>
+                              <p:par>
+                                <p:cTn id="5" presetID="10" presetClass="entr" presetSubtype="0" fill="hold" nodeType="clickEffect">
+                                  <p:stCondLst>
+                                    <p:cond delay="0"/>
+                                  </p:stCondLst>
+                                  <p:childTnLst>
+                                    <p:set>
+                                      <p:cBhvr>
+                                        <p:cTn id="6" dur="1" fill="hold">
+                                          <p:stCondLst>
+                                            <p:cond delay="0"/>
+                                          </p:stCondLst>
+                                        </p:cTn>
+                                        <p:tgtEl>
+                                          <p:spTgt spid="5"/>
+                                        </p:tgtEl>
+                                        <p:attrNameLst>
+                                          <p:attrName>style.visibility</p:attrName>
+                                        </p:attrNameLst>
+                                      </p:cBhvr>
+                                      <p:to>
+                                        <p:strVal val="visible"/>
+                                      </p:to>
+                                    </p:set>
+                                    <p:animEffect transition="in" filter="fade">
+                                      <p:cBhvr>
+                                        <p:cTn id="7" dur="500"/>
+                                        <p:tgtEl>
+                                          <p:spTgt spid="5"/>
+                                        </p:tgtEl>
+                                      </p:cBhvr>
+                                    </p:animEffect>
+                                  </p:childTnLst>
+                                </p:cTn>
+                              </p:par>
+                            </p:childTnLst>
+                          </p:cTn>
+                        </p:par>
+                      </p:childTnLst>
+                    </p:cTn>
+                  </p:par>
+                  <p:par>
+                    <p:cTn id="8" fill="hold">
+                      <p:stCondLst>
+                        <p:cond delay="indefinite"/>
+                      </p:stCondLst>
+                      <p:childTnLst>
+                        <p:par>
+                          <p:cTn id="9" fill="hold">
+                            <p:stCondLst>
+                              <p:cond delay="0"/>
+                            </p:stCondLst>
+                            <p:childTnLst>
+                              <p:par>
+                                <p:cTn id="10" presetID="10" presetClass="entr" presetSubtype="0" fill="hold" nodeType="clickEffect">
+                                  <p:stCondLst>
+                                    <p:cond delay="0"/>
+                                  </p:stCondLst>
+                                  <p:childTnLst>
+                                    <p:set>
+                                      <p:cBhvr>
+                                        <p:cTn id="11" dur="1" fill="hold">
+                                          <p:stCondLst>
+                                            <p:cond delay="0"/>
+                                          </p:stCondLst>
+                                        </p:cTn>
+                                        <p:tgtEl>
+                                          <p:spTgt spid="9"/>
+                                        </p:tgtEl>
+                                        <p:attrNameLst>
+                                          <p:attrName>style.visibility</p:attrName>
+                                        </p:attrNameLst>
+                                      </p:cBhvr>
+                                      <p:to>
+                                        <p:strVal val="visible"/>
+                                      </p:to>
+                                    </p:set>
+                                    <p:animEffect transition="in" filter="fade">
+                                      <p:cBhvr>
+                                        <p:cTn id="12" dur="500"/>
+                                        <p:tgtEl>
+                                          <p:spTgt spid="9"/>
+                                        </p:tgtEl>
+                                      </p:cBhvr>
+                                    </p:animEffect>
+                                  </p:childTnLst>
+                                </p:cTn>
+                              </p:par>
+                            </p:childTnLst>
+                          </p:cTn>
+                        </p:par>
+                      </p:childTnLst>
+                    </p:cTn>
+                  </p:par>
+                  <p:par>
+                    <p:cTn id="13" fill="hold">
+                      <p:stCondLst>
+                        <p:cond delay="indefinite"/>
+                      </p:stCondLst>
+                      <p:childTnLst>
+                        <p:par>
+                          <p:cTn id="14" fill="hold">
+                            <p:stCondLst>
+                              <p:cond delay="0"/>
+                            </p:stCondLst>
+                            <p:childTnLst>
+                              <p:par>
+                                <p:cTn id="15" presetID="10" presetClass="entr" presetSubtype="0" fill="hold" nodeType="clickEffect">
+                                  <p:stCondLst>
+                                    <p:cond delay="0"/>
+                                  </p:stCondLst>
+                                  <p:childTnLst>
+                                    <p:set>
+                                      <p:cBhvr>
+                                        <p:cTn id="16" dur="1" fill="hold">
+                                          <p:stCondLst>
+                                            <p:cond delay="0"/>
+                                          </p:stCondLst>
+                                        </p:cTn>
+                                        <p:tgtEl>
+                                          <p:spTgt spid="13"/>
+                                        </p:tgtEl>
+                                        <p:attrNameLst>
+                                          <p:attrName>style.visibility</p:attrName>
+                                        </p:attrNameLst>
+                                      </p:cBhvr>
+                                      <p:to>
+                                        <p:strVal val="visible"/>
+                                      </p:to>
+                                    </p:set>
+                                    <p:animEffect transition="in" filter="fade">
+                                      <p:cBhvr>
+                                        <p:cTn id="17" dur="500"/>
+                                        <p:tgtEl>
+                                          <p:spTgt spid="13"/>
+                                        </p:tgtEl>
+                                      </p:cBhvr>
+                                    </p:animEffect>
+                                  </p:childTnLst>
+                                </p:cTn>
+                              </p:par>
+                            </p:childTnLst>
+                          </p:cTn>
+                        </p:par>
+                      </p:childTnLst>
+                    </p:cTn>
+                  </p:par>
+                </p:childTnLst>
+              </p:cTn>
+              <p:prevCondLst>
+                <p:cond evt="onPrev" delay="0">
+                  <p:tgtEl>
+                    <p:sldTgt/>
+                  </p:tgtEl>
+                </p:cond>
+              </p:prevCondLst>
+              <p:nextCondLst>
+                <p:cond evt="onNext" delay="0">
+                  <p:tgtEl>
+                    <p:sldTgt/>
+                  </p:tgtEl>
+                </p:cond>
+              </p:nextCondLst>
+            </p:seq>
+          </p:childTnLst>
+        </p:cTn>
       </p:par>
     </p:tnLst>
   </p:timing>
@@ -32364,6 +33623,203 @@
           </a:prstGeom>
         </p:spPr>
       </p:pic>
+      <p:grpSp>
+        <p:nvGrpSpPr>
+          <p:cNvPr id="5" name="Group 4"/>
+          <p:cNvGrpSpPr/>
+          <p:nvPr/>
+        </p:nvGrpSpPr>
+        <p:grpSpPr>
+          <a:xfrm>
+            <a:off x="381000" y="1295400"/>
+            <a:ext cx="1981200" cy="1600200"/>
+            <a:chOff x="1215791" y="2445603"/>
+            <a:chExt cx="1981200" cy="1600200"/>
+          </a:xfrm>
+        </p:grpSpPr>
+        <p:cxnSp>
+          <p:nvCxnSpPr>
+            <p:cNvPr id="6" name="Straight Arrow Connector 5"/>
+            <p:cNvCxnSpPr>
+              <a:stCxn id="7" idx="2"/>
+            </p:cNvCxnSpPr>
+            <p:nvPr/>
+          </p:nvCxnSpPr>
+          <p:spPr>
+            <a:xfrm>
+              <a:off x="2027873" y="3645932"/>
+              <a:ext cx="1169118" cy="399871"/>
+            </a:xfrm>
+            <a:prstGeom prst="straightConnector1">
+              <a:avLst/>
+            </a:prstGeom>
+            <a:ln w="38100">
+              <a:solidFill>
+                <a:schemeClr val="bg2"/>
+              </a:solidFill>
+              <a:tailEnd type="triangle"/>
+            </a:ln>
+          </p:spPr>
+          <p:style>
+            <a:lnRef idx="1">
+              <a:schemeClr val="accent1"/>
+            </a:lnRef>
+            <a:fillRef idx="0">
+              <a:schemeClr val="accent1"/>
+            </a:fillRef>
+            <a:effectRef idx="0">
+              <a:schemeClr val="accent1"/>
+            </a:effectRef>
+            <a:fontRef idx="minor">
+              <a:schemeClr val="tx1"/>
+            </a:fontRef>
+          </p:style>
+        </p:cxnSp>
+        <p:sp>
+          <p:nvSpPr>
+            <p:cNvPr id="7" name="TextBox 6"/>
+            <p:cNvSpPr txBox="1"/>
+            <p:nvPr/>
+          </p:nvSpPr>
+          <p:spPr>
+            <a:xfrm>
+              <a:off x="1215791" y="2445603"/>
+              <a:ext cx="1624163" cy="1200329"/>
+            </a:xfrm>
+            <a:prstGeom prst="rect">
+              <a:avLst/>
+            </a:prstGeom>
+            <a:noFill/>
+          </p:spPr>
+          <p:txBody>
+            <a:bodyPr wrap="none" rtlCol="0">
+              <a:spAutoFit/>
+            </a:bodyPr>
+            <a:lstStyle/>
+            <a:p>
+              <a:pPr marL="0" marR="0" lvl="0" indent="0" algn="l" defTabSz="914400" rtl="0" eaLnBrk="1" fontAlgn="base" latinLnBrk="0" hangingPunct="1">
+                <a:lnSpc>
+                  <a:spcPct val="100000"/>
+                </a:lnSpc>
+                <a:spcBef>
+                  <a:spcPct val="0"/>
+                </a:spcBef>
+                <a:spcAft>
+                  <a:spcPct val="0"/>
+                </a:spcAft>
+                <a:buClrTx/>
+                <a:buSzTx/>
+                <a:buFontTx/>
+                <a:buNone/>
+                <a:tabLst/>
+                <a:defRPr/>
+              </a:pPr>
+              <a:r>
+                <a:rPr lang="en-US" noProof="0" dirty="0" smtClean="0">
+                  <a:solidFill>
+                    <a:srgbClr val="000000"/>
+                  </a:solidFill>
+                </a:rPr>
+                <a:t>Singletons</a:t>
+              </a:r>
+            </a:p>
+            <a:p>
+              <a:pPr marL="0" marR="0" lvl="0" indent="0" algn="l" defTabSz="914400" rtl="0" eaLnBrk="1" fontAlgn="base" latinLnBrk="0" hangingPunct="1">
+                <a:lnSpc>
+                  <a:spcPct val="100000"/>
+                </a:lnSpc>
+                <a:spcBef>
+                  <a:spcPct val="0"/>
+                </a:spcBef>
+                <a:spcAft>
+                  <a:spcPct val="0"/>
+                </a:spcAft>
+                <a:buClrTx/>
+                <a:buSzTx/>
+                <a:buFontTx/>
+                <a:buNone/>
+                <a:tabLst/>
+                <a:defRPr/>
+              </a:pPr>
+              <a:r>
+                <a:rPr kumimoji="0" lang="en-US" sz="2400" b="0" i="0" u="none" strike="noStrike" kern="1200" cap="none" spc="0" normalizeH="0" baseline="0" dirty="0" smtClean="0">
+                  <a:ln>
+                    <a:noFill/>
+                  </a:ln>
+                  <a:solidFill>
+                    <a:srgbClr val="000000"/>
+                  </a:solidFill>
+                  <a:effectLst/>
+                  <a:uLnTx/>
+                  <a:uFillTx/>
+                  <a:latin typeface="Arial" charset="0"/>
+                  <a:ea typeface="+mn-ea"/>
+                  <a:cs typeface="+mn-cs"/>
+                </a:rPr>
+                <a:t>In</a:t>
+              </a:r>
+              <a:r>
+                <a:rPr kumimoji="0" lang="en-US" sz="2400" b="0" i="0" u="none" strike="noStrike" kern="1200" cap="none" spc="0" normalizeH="0" dirty="0" smtClean="0">
+                  <a:ln>
+                    <a:noFill/>
+                  </a:ln>
+                  <a:solidFill>
+                    <a:srgbClr val="000000"/>
+                  </a:solidFill>
+                  <a:effectLst/>
+                  <a:uLnTx/>
+                  <a:uFillTx/>
+                  <a:latin typeface="Arial" charset="0"/>
+                  <a:ea typeface="+mn-ea"/>
+                  <a:cs typeface="+mn-cs"/>
+                </a:rPr>
+                <a:t> Biggest</a:t>
+              </a:r>
+            </a:p>
+            <a:p>
+              <a:pPr marL="0" marR="0" lvl="0" indent="0" algn="l" defTabSz="914400" rtl="0" eaLnBrk="1" fontAlgn="base" latinLnBrk="0" hangingPunct="1">
+                <a:lnSpc>
+                  <a:spcPct val="100000"/>
+                </a:lnSpc>
+                <a:spcBef>
+                  <a:spcPct val="0"/>
+                </a:spcBef>
+                <a:spcAft>
+                  <a:spcPct val="0"/>
+                </a:spcAft>
+                <a:buClrTx/>
+                <a:buSzTx/>
+                <a:buFontTx/>
+                <a:buNone/>
+                <a:tabLst/>
+                <a:defRPr/>
+              </a:pPr>
+              <a:r>
+                <a:rPr lang="en-US" baseline="0" noProof="0" smtClean="0">
+                  <a:solidFill>
+                    <a:srgbClr val="000000"/>
+                  </a:solidFill>
+                </a:rPr>
+                <a:t>Cluster</a:t>
+              </a:r>
+              <a:endParaRPr kumimoji="0" lang="en-US" sz="2400" b="0" i="0" u="none" strike="noStrike" kern="1200" cap="none" spc="0" normalizeH="0" baseline="0" noProof="0" dirty="0">
+                <a:ln>
+                  <a:noFill/>
+                </a:ln>
+                <a:solidFill>
+                  <a:srgbClr val="000000"/>
+                </a:solidFill>
+                <a:effectLst/>
+                <a:uLnTx/>
+                <a:uFillTx/>
+                <a:latin typeface="Arial" charset="0"/>
+                <a:ea typeface="+mn-ea"/>
+                <a:cs typeface="+mn-cs"/>
+              </a:endParaRPr>
+            </a:p>
+          </p:txBody>
+        </p:sp>
+      </p:grpSp>
     </p:spTree>
     <p:extLst>
       <p:ext uri="{BB962C8B-B14F-4D97-AF65-F5344CB8AC3E}">
@@ -32377,7 +33833,83 @@
   <p:timing>
     <p:tnLst>
       <p:par>
-        <p:cTn id="1" dur="indefinite" restart="never" nodeType="tmRoot"/>
+        <p:cTn id="1" dur="indefinite" restart="never" nodeType="tmRoot">
+          <p:childTnLst>
+            <p:seq concurrent="1" nextAc="seek">
+              <p:cTn id="2" dur="indefinite" nodeType="mainSeq">
+                <p:childTnLst>
+                  <p:par>
+                    <p:cTn id="3" fill="hold">
+                      <p:stCondLst>
+                        <p:cond delay="indefinite"/>
+                      </p:stCondLst>
+                      <p:childTnLst>
+                        <p:par>
+                          <p:cTn id="4" fill="hold">
+                            <p:stCondLst>
+                              <p:cond delay="0"/>
+                            </p:stCondLst>
+                            <p:childTnLst>
+                              <p:par>
+                                <p:cTn id="5" presetID="10" presetClass="entr" presetSubtype="0" fill="hold" nodeType="clickEffect">
+                                  <p:stCondLst>
+                                    <p:cond delay="0"/>
+                                  </p:stCondLst>
+                                  <p:childTnLst>
+                                    <p:set>
+                                      <p:cBhvr>
+                                        <p:cTn id="6" dur="1" fill="hold">
+                                          <p:stCondLst>
+                                            <p:cond delay="0"/>
+                                          </p:stCondLst>
+                                        </p:cTn>
+                                        <p:tgtEl>
+                                          <p:spTgt spid="5"/>
+                                        </p:tgtEl>
+                                        <p:attrNameLst>
+                                          <p:attrName>style.visibility</p:attrName>
+                                        </p:attrNameLst>
+                                      </p:cBhvr>
+                                      <p:to>
+                                        <p:strVal val="visible"/>
+                                      </p:to>
+                                    </p:set>
+                                    <p:animEffect transition="in" filter="fade">
+                                      <p:cBhvr>
+                                        <p:cTn id="7" dur="500"/>
+                                        <p:tgtEl>
+                                          <p:spTgt spid="5"/>
+                                        </p:tgtEl>
+                                      </p:cBhvr>
+                                    </p:animEffect>
+                                  </p:childTnLst>
+                                </p:cTn>
+                              </p:par>
+                            </p:childTnLst>
+                          </p:cTn>
+                        </p:par>
+                      </p:childTnLst>
+                    </p:cTn>
+                  </p:par>
+                </p:childTnLst>
+              </p:cTn>
+              <p:prevCondLst>
+                <p:cond evt="onPrev" delay="0">
+                  <p:tgtEl>
+                    <p:sldTgt/>
+                  </p:tgtEl>
+                </p:cond>
+              </p:prevCondLst>
+              <p:nextCondLst>
+                <p:cond evt="onNext" delay="0">
+                  <p:tgtEl>
+                    <p:sldTgt/>
+                  </p:tgtEl>
+                </p:cond>
+              </p:nextCondLst>
+            </p:seq>
+          </p:childTnLst>
+        </p:cTn>
       </p:par>
     </p:tnLst>
   </p:timing>

</xml_diff>